<commit_message>
updated links in slides
</commit_message>
<xml_diff>
--- a/02-lesson-plans/part-time/01-Week/02-Day/Slide-Shows/Gitn_Pro_HTML_CSS.pptx
+++ b/02-lesson-plans/part-time/01-Week/02-Day/Slide-Shows/Gitn_Pro_HTML_CSS.pptx
@@ -15628,7 +15628,7 @@
         <p:spPr>
           <a:xfrm>
             <a:off x="196850" y="838198"/>
-            <a:ext cx="8947150" cy="5406107"/>
+            <a:ext cx="8947150" cy="4745707"/>
           </a:xfrm>
           <a:prstGeom prst="rect">
             <a:avLst/>
@@ -15718,7 +15718,7 @@
                 </a:uFill>
                 <a:hlinkClick r:id="rId2" invalidUrl="" action="" tgtFrame="" tooltip="" history="1" highlightClick="0" endSnd="0"/>
               </a:rPr>
-              <a:t>http://smu.bootcampcontent.com/SMU-Coding-Bootcamp/SMDA201801FSF4-Class-Repository-FSF/blob/master/README.md</a:t>
+              <a:t>Class Content ReadMe</a:t>
             </a:r>
           </a:p>
           <a:p>
@@ -16458,8 +16458,8 @@
         </p:nvSpPr>
         <p:spPr>
           <a:xfrm>
-            <a:off x="5257800" y="2514599"/>
-            <a:ext cx="3733800" cy="1150758"/>
+            <a:off x="5257800" y="1701799"/>
+            <a:ext cx="3733800" cy="1684158"/>
           </a:xfrm>
           <a:prstGeom prst="rect">
             <a:avLst/>
@@ -16491,7 +16491,22 @@
               </a:defRPr>
             </a:pPr>
             <a:r>
-              <a:t>Follow this handy Guide!</a:t>
+              <a:t>Follow this handy Guide:</a:t>
+            </a:r>
+            <a:br/>
+            <a:r>
+              <a:rPr b="0" u="sng">
+                <a:solidFill>
+                  <a:srgbClr val="0000FF"/>
+                </a:solidFill>
+                <a:uFill>
+                  <a:solidFill>
+                    <a:srgbClr val="0000FF"/>
+                  </a:solidFill>
+                </a:uFill>
+                <a:hlinkClick r:id="rId3" invalidUrl="" action="" tgtFrame="" tooltip="" history="1" highlightClick="0" endSnd="0"/>
+              </a:rPr>
+              <a:t>Amazing Github Guide!</a:t>
             </a:r>
           </a:p>
           <a:p>
@@ -16506,6 +16521,20 @@
                 <a:sym typeface="Arial"/>
               </a:defRPr>
             </a:pPr>
+          </a:p>
+          <a:p>
+            <a:pPr marL="285750" indent="-285750">
+              <a:buSzPct val="100000"/>
+              <a:buFont typeface="Arial"/>
+              <a:buChar char="•"/>
+              <a:defRPr>
+                <a:latin typeface="Arial"/>
+                <a:ea typeface="Arial"/>
+                <a:cs typeface="Arial"/>
+                <a:sym typeface="Arial"/>
+              </a:defRPr>
+            </a:pPr>
+            <a:endParaRPr b="1"/>
           </a:p>
           <a:p>
             <a:pPr marL="285750" indent="-285750">
@@ -18642,7 +18671,7 @@
         <p:spPr>
           <a:xfrm>
             <a:off x="304799" y="761998"/>
-            <a:ext cx="8740776" cy="3388053"/>
+            <a:ext cx="8740776" cy="2727653"/>
           </a:xfrm>
           <a:prstGeom prst="rect">
             <a:avLst/>
@@ -18692,7 +18721,7 @@
                 </a:uFill>
                 <a:hlinkClick r:id="rId2" invalidUrl="" action="" tgtFrame="" tooltip="" history="1" highlightClick="0" endSnd="0"/>
               </a:rPr>
-              <a:t>http://smu.bootcampcontent.com/SMU-Coding-Bootcamp/SMDA201801FSF4-Class-Repository-FSF/tree/master/01-Class-Content/01-html-git-css</a:t>
+              <a:t>Week 1 Class Content</a:t>
             </a:r>
             <a:endParaRPr sz="2400"/>
           </a:p>

</xml_diff>